<commit_message>
add complex and fix input
</commit_message>
<xml_diff>
--- a/output_presentation.pptx
+++ b/output_presentation.pptx
@@ -15,6 +15,8 @@
     <p:sldId id="263" r:id="rId14"/>
     <p:sldId id="264" r:id="rId15"/>
     <p:sldId id="265" r:id="rId16"/>
+    <p:sldId id="266" r:id="rId17"/>
+    <p:sldId id="267" r:id="rId18"/>
   </p:sldIdLst>
   <p:sldSz cx="9144000" cy="6858000" type="screen4x3"/>
   <p:notesSz cx="6858000" cy="9144000"/>
@@ -3134,13 +3136,7 @@
           <a:lstStyle/>
           <a:p>
             <a:r>
-              <a:t>Вопрос: Эта птица весьма крупная с массивными лапами, быстро бегает, а вот летать не умеет. Является социальным животным, живет около 40 лет. Интересным фактом о ней является то, что глаз птицы является больше ее мозга. Что это за птица?</a:t>
-            </a:r>
-          </a:p>
-          <a:p/>
-          <a:p>
-            <a:r>
-              <a:t>Класс: 1-4 класс</a:t>
+              <a:t>Вопрос: В настоящее время ИМ пользуется более 2,5 млрд человек. В 1991 году ОН стал общедоступным, сейчас есть почти в каждом доме. По статистике в современном мире каждая восьмая супружеская пара познакомилась в НЕМ. Назовите ЕГО.</a:t>
             </a:r>
           </a:p>
         </p:txBody>
@@ -3196,7 +3192,123 @@
           <a:lstStyle/>
           <a:p>
             <a:r>
-              <a:t>Ответ: компас</a:t>
+              <a:t>Ответ: роса</a:t>
+            </a:r>
+          </a:p>
+        </p:txBody>
+      </p:sp>
+    </p:spTree>
+  </p:cSld>
+  <p:clrMapOvr>
+    <a:masterClrMapping/>
+  </p:clrMapOvr>
+</p:sld>
+</file>
+
+<file path=ppt/slides/slide11.xml><?xml version="1.0" encoding="utf-8"?>
+<p:sld xmlns:a="http://schemas.openxmlformats.org/drawingml/2006/main" xmlns:p="http://schemas.openxmlformats.org/presentationml/2006/main" xmlns:r="http://schemas.openxmlformats.org/officeDocument/2006/relationships">
+  <p:cSld>
+    <p:spTree>
+      <p:nvGrpSpPr>
+        <p:cNvPr id="1" name=""/>
+        <p:cNvGrpSpPr/>
+        <p:nvPr/>
+      </p:nvGrpSpPr>
+      <p:grpSpPr/>
+      <p:sp>
+        <p:nvSpPr>
+          <p:cNvPr id="2" name="Title 1"/>
+          <p:cNvSpPr>
+            <a:spLocks noGrp="1"/>
+          </p:cNvSpPr>
+          <p:nvPr>
+            <p:ph type="title"/>
+          </p:nvPr>
+        </p:nvSpPr>
+        <p:spPr/>
+        <p:txBody>
+          <a:bodyPr/>
+          <a:lstStyle/>
+          <a:p>
+            <a:r>
+              <a:t>ЧГК</a:t>
+            </a:r>
+          </a:p>
+        </p:txBody>
+      </p:sp>
+      <p:sp>
+        <p:nvSpPr>
+          <p:cNvPr id="3" name="Content Placeholder 2"/>
+          <p:cNvSpPr>
+            <a:spLocks noGrp="1"/>
+          </p:cNvSpPr>
+          <p:nvPr>
+            <p:ph idx="1"/>
+          </p:nvPr>
+        </p:nvSpPr>
+        <p:spPr/>
+        <p:txBody>
+          <a:bodyPr/>
+          <a:lstStyle/>
+          <a:p>
+            <a:r>
+              <a:t>Вопрос: Некоторые ученые в Древней Греции воспринимали натуральные числа как собрание ИХ. При этом саму ЕЕ числом они не считали. Отсюда пошла теория, что ОНА — это не начало числового ряда, а лишь некий начальный процесс. Такого мнения придерживался Платон. Назовите ЕЕ.</a:t>
+            </a:r>
+          </a:p>
+        </p:txBody>
+      </p:sp>
+    </p:spTree>
+  </p:cSld>
+  <p:clrMapOvr>
+    <a:masterClrMapping/>
+  </p:clrMapOvr>
+</p:sld>
+</file>
+
+<file path=ppt/slides/slide12.xml><?xml version="1.0" encoding="utf-8"?>
+<p:sld xmlns:a="http://schemas.openxmlformats.org/drawingml/2006/main" xmlns:p="http://schemas.openxmlformats.org/presentationml/2006/main" xmlns:r="http://schemas.openxmlformats.org/officeDocument/2006/relationships">
+  <p:cSld>
+    <p:spTree>
+      <p:nvGrpSpPr>
+        <p:cNvPr id="1" name=""/>
+        <p:cNvGrpSpPr/>
+        <p:nvPr/>
+      </p:nvGrpSpPr>
+      <p:grpSpPr/>
+      <p:sp>
+        <p:nvSpPr>
+          <p:cNvPr id="2" name="Title 1"/>
+          <p:cNvSpPr>
+            <a:spLocks noGrp="1"/>
+          </p:cNvSpPr>
+          <p:nvPr>
+            <p:ph type="title"/>
+          </p:nvPr>
+        </p:nvSpPr>
+        <p:spPr/>
+        <p:txBody>
+          <a:bodyPr/>
+          <a:lstStyle/>
+          <a:p/>
+        </p:txBody>
+      </p:sp>
+      <p:sp>
+        <p:nvSpPr>
+          <p:cNvPr id="3" name="Content Placeholder 2"/>
+          <p:cNvSpPr>
+            <a:spLocks noGrp="1"/>
+          </p:cNvSpPr>
+          <p:nvPr>
+            <p:ph idx="1"/>
+          </p:nvPr>
+        </p:nvSpPr>
+        <p:spPr/>
+        <p:txBody>
+          <a:bodyPr/>
+          <a:lstStyle/>
+          <a:p>
+            <a:r>
+              <a:t>Ответ: единица</a:t>
             </a:r>
           </a:p>
         </p:txBody>
@@ -3252,7 +3364,7 @@
           <a:lstStyle/>
           <a:p>
             <a:r>
-              <a:t>Ответ: страус</a:t>
+              <a:t>Ответ: интернет</a:t>
             </a:r>
           </a:p>
         </p:txBody>
@@ -3312,12 +3424,7 @@
           <a:lstStyle/>
           <a:p>
             <a:r>
-              <a:t>Вопрос: ОНИ впервые появились в конце XIX века и стали первой обувью, обеспечивающей бесшумную ходьбу. В настоящее время ОНИ являются частью повседневного гардероба, хотя изначально ОНИ предназначались для людей, занимающихся определенным видом деятельности. Назовите ИХ.</a:t>
-            </a:r>
-          </a:p>
-          <a:p>
-            <a:r>
-              <a:t>Класс: 1-4 класс</a:t>
+              <a:t>Вопрос: Самым первым материалом для создания ЭТОГО служил рыбий скелет. А впервые в привычном для нас виде ЭТО появилось в Древнем Риме и было сделано из слоновой кости. На Руси ЭТО делали из дерева. А сейчас ЭТО все чаще делают из пластика. Причем чаще всего ЭТИМ пользуются представительницы женского пола. Что ЭТО?</a:t>
             </a:r>
           </a:p>
         </p:txBody>
@@ -3373,7 +3480,7 @@
           <a:lstStyle/>
           <a:p>
             <a:r>
-              <a:t>Ответ: кроссовки / кеды</a:t>
+              <a:t>Ответ: расческа / гребень для волос</a:t>
             </a:r>
           </a:p>
         </p:txBody>
@@ -3433,12 +3540,7 @@
           <a:lstStyle/>
           <a:p>
             <a:r>
-              <a:t>Вопрос: Это животное может выбрасывать свой язык на расстояние, равное половине длины туловища. Его глаза способны вращаться независимо друг от друга, поэтому ОН может смотреть одновременно во все стороны, не двигая головой. Правда ученые все еще не определились с расцветкой этого животного. Назовите ЕГО. </a:t>
-            </a:r>
-          </a:p>
-          <a:p>
-            <a:r>
-              <a:t>Класс: 1-4 класс</a:t>
+              <a:t>Вопрос: Это животное - единственное, которое не умеет зевать. Длина ЕГО языка достигает 50 см, а длина хвоста - 2,5 м. Удивительно то, что строение шеи этого животного не позволяет ему дотянуться до земли, поэтому ему приходится вставать на колени, чтобы поднять что-то с пола. Назовите это животное.</a:t>
             </a:r>
           </a:p>
         </p:txBody>
@@ -3494,7 +3596,7 @@
           <a:lstStyle/>
           <a:p>
             <a:r>
-              <a:t>Ответ: хамелеон</a:t>
+              <a:t>Ответ: жираф</a:t>
             </a:r>
           </a:p>
         </p:txBody>
@@ -3554,12 +3656,7 @@
           <a:lstStyle/>
           <a:p>
             <a:r>
-              <a:t>Вопрос: Загадана единственная птица, которая может плавать, но не может летать. Кроме того, это единственная птица, которая ходит стоя. Назовите эту птицу.</a:t>
-            </a:r>
-          </a:p>
-          <a:p>
-            <a:r>
-              <a:t>Класс: 1-4 класс</a:t>
+              <a:t>Вопрос: В 1765 г. Екатерина II озаботилась помощью голодающим крестьянам Финляндии. После некоторых поисков, коллегия, которой был поручен этот вопрос, решила, что лучше всего использовать “земляные яблоки”. Что ЭТО было?</a:t>
             </a:r>
           </a:p>
         </p:txBody>
@@ -3615,7 +3712,7 @@
           <a:lstStyle/>
           <a:p>
             <a:r>
-              <a:t>Ответ: пингвин</a:t>
+              <a:t>Ответ: картофель / картошка</a:t>
             </a:r>
           </a:p>
         </p:txBody>
@@ -3675,12 +3772,7 @@
           <a:lstStyle/>
           <a:p>
             <a:r>
-              <a:t>Вопрос: Совершенствование этого предмета помогло ускорить развитие водных странствий. Простейшую модель ЭТОГО можно соорудить с помощью таза с водой, швейной иглы и маленькой бумажки или растительного масла. Что это за предмет?</a:t>
-            </a:r>
-          </a:p>
-          <a:p>
-            <a:r>
-              <a:t>Класс: 1-4 класс</a:t>
+              <a:t>Вопрос: Существует множество легенд об этом явлении. Ему приписывают чудодейственные свойства. Говорят, что им можно исцелиться или избавиться от злых чар. Очень часто ЭТО называют “водяные алмазы”. Что ЭТО?</a:t>
             </a:r>
           </a:p>
         </p:txBody>

</xml_diff>